<commit_message>
Updated T-Racer w difficulty fixes and clipping
</commit_message>
<xml_diff>
--- a/randy/Mockup Photos/Trousdale Racer Development Deck.pptx
+++ b/randy/Mockup Photos/Trousdale Racer Development Deck.pptx
@@ -121,6 +121,11 @@
       </a:defRPr>
     </a:lvl9pPr>
   </p:defaultTextStyle>
+  <p:extLst>
+    <p:ext uri="{EFAFB233-063F-42B5-8137-9DF3F51BA10A}">
+      <p15:sldGuideLst xmlns:p15="http://schemas.microsoft.com/office/powerpoint/2012/main"/>
+    </p:ext>
+  </p:extLst>
 </p:presentation>
 </file>
 
@@ -398,7 +403,7 @@
           <a:p>
             <a:fld id="{870AA7EE-7FDB-4E72-8AFF-F5B274E87857}" type="datetimeFigureOut">
               <a:rPr lang="en-US" smtClean="0"/>
-              <a:t>11/16/2019</a:t>
+              <a:t>11/17/2019</a:t>
             </a:fld>
             <a:endParaRPr lang="en-US"/>
           </a:p>
@@ -812,7 +817,7 @@
           <a:p>
             <a:fld id="{870AA7EE-7FDB-4E72-8AFF-F5B274E87857}" type="datetimeFigureOut">
               <a:rPr lang="en-US" smtClean="0"/>
-              <a:t>11/16/2019</a:t>
+              <a:t>11/17/2019</a:t>
             </a:fld>
             <a:endParaRPr lang="en-US"/>
           </a:p>
@@ -1148,7 +1153,7 @@
           <a:p>
             <a:fld id="{870AA7EE-7FDB-4E72-8AFF-F5B274E87857}" type="datetimeFigureOut">
               <a:rPr lang="en-US" smtClean="0"/>
-              <a:t>11/16/2019</a:t>
+              <a:t>11/17/2019</a:t>
             </a:fld>
             <a:endParaRPr lang="en-US"/>
           </a:p>
@@ -1553,7 +1558,7 @@
           <a:p>
             <a:fld id="{870AA7EE-7FDB-4E72-8AFF-F5B274E87857}" type="datetimeFigureOut">
               <a:rPr lang="en-US" smtClean="0"/>
-              <a:t>11/16/2019</a:t>
+              <a:t>11/17/2019</a:t>
             </a:fld>
             <a:endParaRPr lang="en-US"/>
           </a:p>
@@ -2121,7 +2126,7 @@
           <a:p>
             <a:fld id="{870AA7EE-7FDB-4E72-8AFF-F5B274E87857}" type="datetimeFigureOut">
               <a:rPr lang="en-US" smtClean="0"/>
-              <a:t>11/16/2019</a:t>
+              <a:t>11/17/2019</a:t>
             </a:fld>
             <a:endParaRPr lang="en-US"/>
           </a:p>
@@ -2802,7 +2807,7 @@
           <a:p>
             <a:fld id="{870AA7EE-7FDB-4E72-8AFF-F5B274E87857}" type="datetimeFigureOut">
               <a:rPr lang="en-US" smtClean="0"/>
-              <a:t>11/16/2019</a:t>
+              <a:t>11/17/2019</a:t>
             </a:fld>
             <a:endParaRPr lang="en-US"/>
           </a:p>
@@ -3715,7 +3720,7 @@
           <a:p>
             <a:fld id="{870AA7EE-7FDB-4E72-8AFF-F5B274E87857}" type="datetimeFigureOut">
               <a:rPr lang="en-US" smtClean="0"/>
-              <a:t>11/16/2019</a:t>
+              <a:t>11/17/2019</a:t>
             </a:fld>
             <a:endParaRPr lang="en-US"/>
           </a:p>
@@ -4028,7 +4033,7 @@
           <a:p>
             <a:fld id="{870AA7EE-7FDB-4E72-8AFF-F5B274E87857}" type="datetimeFigureOut">
               <a:rPr lang="en-US" smtClean="0"/>
-              <a:t>11/16/2019</a:t>
+              <a:t>11/17/2019</a:t>
             </a:fld>
             <a:endParaRPr lang="en-US"/>
           </a:p>
@@ -4292,7 +4297,7 @@
           <a:p>
             <a:fld id="{870AA7EE-7FDB-4E72-8AFF-F5B274E87857}" type="datetimeFigureOut">
               <a:rPr lang="en-US" smtClean="0"/>
-              <a:t>11/16/2019</a:t>
+              <a:t>11/17/2019</a:t>
             </a:fld>
             <a:endParaRPr lang="en-US"/>
           </a:p>
@@ -4615,7 +4620,7 @@
           <a:p>
             <a:fld id="{870AA7EE-7FDB-4E72-8AFF-F5B274E87857}" type="datetimeFigureOut">
               <a:rPr lang="en-US" smtClean="0"/>
-              <a:t>11/16/2019</a:t>
+              <a:t>11/17/2019</a:t>
             </a:fld>
             <a:endParaRPr lang="en-US"/>
           </a:p>
@@ -5004,7 +5009,7 @@
           <a:p>
             <a:fld id="{870AA7EE-7FDB-4E72-8AFF-F5B274E87857}" type="datetimeFigureOut">
               <a:rPr lang="en-US" smtClean="0"/>
-              <a:t>11/16/2019</a:t>
+              <a:t>11/17/2019</a:t>
             </a:fld>
             <a:endParaRPr lang="en-US"/>
           </a:p>
@@ -5380,7 +5385,7 @@
           <a:p>
             <a:fld id="{870AA7EE-7FDB-4E72-8AFF-F5B274E87857}" type="datetimeFigureOut">
               <a:rPr lang="en-US" smtClean="0"/>
-              <a:t>11/16/2019</a:t>
+              <a:t>11/17/2019</a:t>
             </a:fld>
             <a:endParaRPr lang="en-US"/>
           </a:p>
@@ -5886,7 +5891,7 @@
           <a:p>
             <a:fld id="{870AA7EE-7FDB-4E72-8AFF-F5B274E87857}" type="datetimeFigureOut">
               <a:rPr lang="en-US" smtClean="0"/>
-              <a:t>11/16/2019</a:t>
+              <a:t>11/17/2019</a:t>
             </a:fld>
             <a:endParaRPr lang="en-US"/>
           </a:p>
@@ -6143,7 +6148,7 @@
           <a:p>
             <a:fld id="{870AA7EE-7FDB-4E72-8AFF-F5B274E87857}" type="datetimeFigureOut">
               <a:rPr lang="en-US" smtClean="0"/>
-              <a:t>11/16/2019</a:t>
+              <a:t>11/17/2019</a:t>
             </a:fld>
             <a:endParaRPr lang="en-US"/>
           </a:p>
@@ -6306,7 +6311,7 @@
           <a:p>
             <a:fld id="{870AA7EE-7FDB-4E72-8AFF-F5B274E87857}" type="datetimeFigureOut">
               <a:rPr lang="en-US" smtClean="0"/>
-              <a:t>11/16/2019</a:t>
+              <a:t>11/17/2019</a:t>
             </a:fld>
             <a:endParaRPr lang="en-US"/>
           </a:p>
@@ -6696,7 +6701,7 @@
           <a:p>
             <a:fld id="{870AA7EE-7FDB-4E72-8AFF-F5B274E87857}" type="datetimeFigureOut">
               <a:rPr lang="en-US" smtClean="0"/>
-              <a:t>11/16/2019</a:t>
+              <a:t>11/17/2019</a:t>
             </a:fld>
             <a:endParaRPr lang="en-US"/>
           </a:p>
@@ -7105,7 +7110,7 @@
           <a:p>
             <a:fld id="{870AA7EE-7FDB-4E72-8AFF-F5B274E87857}" type="datetimeFigureOut">
               <a:rPr lang="en-US" smtClean="0"/>
-              <a:t>11/16/2019</a:t>
+              <a:t>11/17/2019</a:t>
             </a:fld>
             <a:endParaRPr lang="en-US"/>
           </a:p>
@@ -7349,7 +7354,7 @@
           <a:p>
             <a:fld id="{870AA7EE-7FDB-4E72-8AFF-F5B274E87857}" type="datetimeFigureOut">
               <a:rPr lang="en-US" smtClean="0"/>
-              <a:t>11/16/2019</a:t>
+              <a:t>11/17/2019</a:t>
             </a:fld>
             <a:endParaRPr lang="en-US"/>
           </a:p>
@@ -7816,6 +7821,228 @@
           </a:p>
         </p:txBody>
       </p:sp>
+      <p:sp>
+        <p:nvSpPr>
+          <p:cNvPr id="4" name="Subtitle 2">
+            <a:extLst>
+              <a:ext uri="{FF2B5EF4-FFF2-40B4-BE49-F238E27FC236}">
+                <a16:creationId xmlns:a16="http://schemas.microsoft.com/office/drawing/2014/main" id="{7D6205B9-5A74-4EDC-ACCF-20188A59C88B}"/>
+              </a:ext>
+            </a:extLst>
+          </p:cNvPr>
+          <p:cNvSpPr txBox="1">
+            <a:spLocks/>
+          </p:cNvSpPr>
+          <p:nvPr/>
+        </p:nvSpPr>
+        <p:spPr>
+          <a:xfrm>
+            <a:off x="3931029" y="2698231"/>
+            <a:ext cx="8144134" cy="1695808"/>
+          </a:xfrm>
+          <a:prstGeom prst="rect">
+            <a:avLst/>
+          </a:prstGeom>
+        </p:spPr>
+        <p:txBody>
+          <a:bodyPr vert="horz" lIns="91440" tIns="45720" rIns="91440" bIns="45720" rtlCol="0">
+            <a:normAutofit/>
+          </a:bodyPr>
+          <a:lstStyle>
+            <a:lvl1pPr marL="0" indent="0" algn="r" defTabSz="914400" rtl="0" eaLnBrk="1" latinLnBrk="0" hangingPunct="1">
+              <a:lnSpc>
+                <a:spcPct val="90000"/>
+              </a:lnSpc>
+              <a:spcBef>
+                <a:spcPts val="1000"/>
+              </a:spcBef>
+              <a:buFont typeface="Arial" panose="020B0604020202020204" pitchFamily="34" charset="0"/>
+              <a:buNone/>
+              <a:defRPr sz="2000" kern="1200">
+                <a:solidFill>
+                  <a:schemeClr val="tx1"/>
+                </a:solidFill>
+                <a:latin typeface="+mn-lt"/>
+                <a:ea typeface="+mn-ea"/>
+                <a:cs typeface="+mn-cs"/>
+              </a:defRPr>
+            </a:lvl1pPr>
+            <a:lvl2pPr marL="457200" indent="0" algn="ctr" defTabSz="914400" rtl="0" eaLnBrk="1" latinLnBrk="0" hangingPunct="1">
+              <a:lnSpc>
+                <a:spcPct val="90000"/>
+              </a:lnSpc>
+              <a:spcBef>
+                <a:spcPts val="500"/>
+              </a:spcBef>
+              <a:buFont typeface="Arial" panose="020B0604020202020204" pitchFamily="34" charset="0"/>
+              <a:buNone/>
+              <a:defRPr sz="2000" kern="1200">
+                <a:solidFill>
+                  <a:schemeClr val="tx1"/>
+                </a:solidFill>
+                <a:latin typeface="+mn-lt"/>
+                <a:ea typeface="+mn-ea"/>
+                <a:cs typeface="+mn-cs"/>
+              </a:defRPr>
+            </a:lvl2pPr>
+            <a:lvl3pPr marL="914400" indent="0" algn="ctr" defTabSz="914400" rtl="0" eaLnBrk="1" latinLnBrk="0" hangingPunct="1">
+              <a:lnSpc>
+                <a:spcPct val="90000"/>
+              </a:lnSpc>
+              <a:spcBef>
+                <a:spcPts val="500"/>
+              </a:spcBef>
+              <a:buFont typeface="Arial" panose="020B0604020202020204" pitchFamily="34" charset="0"/>
+              <a:buNone/>
+              <a:defRPr sz="1800" kern="1200">
+                <a:solidFill>
+                  <a:schemeClr val="tx1"/>
+                </a:solidFill>
+                <a:latin typeface="+mn-lt"/>
+                <a:ea typeface="+mn-ea"/>
+                <a:cs typeface="+mn-cs"/>
+              </a:defRPr>
+            </a:lvl3pPr>
+            <a:lvl4pPr marL="1371600" indent="0" algn="ctr" defTabSz="914400" rtl="0" eaLnBrk="1" latinLnBrk="0" hangingPunct="1">
+              <a:lnSpc>
+                <a:spcPct val="90000"/>
+              </a:lnSpc>
+              <a:spcBef>
+                <a:spcPts val="500"/>
+              </a:spcBef>
+              <a:buFont typeface="Arial" panose="020B0604020202020204" pitchFamily="34" charset="0"/>
+              <a:buNone/>
+              <a:defRPr sz="1600" kern="1200">
+                <a:solidFill>
+                  <a:schemeClr val="tx1"/>
+                </a:solidFill>
+                <a:latin typeface="+mn-lt"/>
+                <a:ea typeface="+mn-ea"/>
+                <a:cs typeface="+mn-cs"/>
+              </a:defRPr>
+            </a:lvl4pPr>
+            <a:lvl5pPr marL="1828800" indent="0" algn="ctr" defTabSz="914400" rtl="0" eaLnBrk="1" latinLnBrk="0" hangingPunct="1">
+              <a:lnSpc>
+                <a:spcPct val="90000"/>
+              </a:lnSpc>
+              <a:spcBef>
+                <a:spcPts val="500"/>
+              </a:spcBef>
+              <a:buFont typeface="Arial" panose="020B0604020202020204" pitchFamily="34" charset="0"/>
+              <a:buNone/>
+              <a:defRPr sz="1600" kern="1200">
+                <a:solidFill>
+                  <a:schemeClr val="tx1"/>
+                </a:solidFill>
+                <a:latin typeface="+mn-lt"/>
+                <a:ea typeface="+mn-ea"/>
+                <a:cs typeface="+mn-cs"/>
+              </a:defRPr>
+            </a:lvl5pPr>
+            <a:lvl6pPr marL="2286000" indent="0" algn="ctr" defTabSz="914400" rtl="0" eaLnBrk="1" latinLnBrk="0" hangingPunct="1">
+              <a:lnSpc>
+                <a:spcPct val="90000"/>
+              </a:lnSpc>
+              <a:spcBef>
+                <a:spcPts val="500"/>
+              </a:spcBef>
+              <a:buFont typeface="Arial" panose="020B0604020202020204" pitchFamily="34" charset="0"/>
+              <a:buNone/>
+              <a:defRPr sz="1600" kern="1200">
+                <a:solidFill>
+                  <a:schemeClr val="tx1"/>
+                </a:solidFill>
+                <a:latin typeface="+mn-lt"/>
+                <a:ea typeface="+mn-ea"/>
+                <a:cs typeface="+mn-cs"/>
+              </a:defRPr>
+            </a:lvl6pPr>
+            <a:lvl7pPr marL="2743200" indent="0" algn="ctr" defTabSz="914400" rtl="0" eaLnBrk="1" latinLnBrk="0" hangingPunct="1">
+              <a:lnSpc>
+                <a:spcPct val="90000"/>
+              </a:lnSpc>
+              <a:spcBef>
+                <a:spcPts val="500"/>
+              </a:spcBef>
+              <a:buFont typeface="Arial" panose="020B0604020202020204" pitchFamily="34" charset="0"/>
+              <a:buNone/>
+              <a:defRPr sz="1600" kern="1200">
+                <a:solidFill>
+                  <a:schemeClr val="tx1"/>
+                </a:solidFill>
+                <a:latin typeface="+mn-lt"/>
+                <a:ea typeface="+mn-ea"/>
+                <a:cs typeface="+mn-cs"/>
+              </a:defRPr>
+            </a:lvl7pPr>
+            <a:lvl8pPr marL="3200400" indent="0" algn="ctr" defTabSz="914400" rtl="0" eaLnBrk="1" latinLnBrk="0" hangingPunct="1">
+              <a:lnSpc>
+                <a:spcPct val="90000"/>
+              </a:lnSpc>
+              <a:spcBef>
+                <a:spcPts val="500"/>
+              </a:spcBef>
+              <a:buFont typeface="Arial" panose="020B0604020202020204" pitchFamily="34" charset="0"/>
+              <a:buNone/>
+              <a:defRPr sz="1600" kern="1200">
+                <a:solidFill>
+                  <a:schemeClr val="tx1"/>
+                </a:solidFill>
+                <a:latin typeface="+mn-lt"/>
+                <a:ea typeface="+mn-ea"/>
+                <a:cs typeface="+mn-cs"/>
+              </a:defRPr>
+            </a:lvl8pPr>
+            <a:lvl9pPr marL="3657600" indent="0" algn="ctr" defTabSz="914400" rtl="0" eaLnBrk="1" latinLnBrk="0" hangingPunct="1">
+              <a:lnSpc>
+                <a:spcPct val="90000"/>
+              </a:lnSpc>
+              <a:spcBef>
+                <a:spcPts val="500"/>
+              </a:spcBef>
+              <a:buFont typeface="Arial" panose="020B0604020202020204" pitchFamily="34" charset="0"/>
+              <a:buNone/>
+              <a:defRPr sz="1600" kern="1200">
+                <a:solidFill>
+                  <a:schemeClr val="tx1"/>
+                </a:solidFill>
+                <a:latin typeface="+mn-lt"/>
+                <a:ea typeface="+mn-ea"/>
+                <a:cs typeface="+mn-cs"/>
+              </a:defRPr>
+            </a:lvl9pPr>
+          </a:lstStyle>
+          <a:p>
+            <a:r>
+              <a:rPr lang="en-US" dirty="0"/>
+              <a:t>Charlie Feuerborn</a:t>
+            </a:r>
+          </a:p>
+          <a:p>
+            <a:r>
+              <a:rPr lang="en-US" dirty="0"/>
+              <a:t>Michelle Wong</a:t>
+            </a:r>
+          </a:p>
+          <a:p>
+            <a:r>
+              <a:rPr lang="en-US" dirty="0"/>
+              <a:t>Nebula (Xinyin) Liu</a:t>
+            </a:r>
+          </a:p>
+          <a:p>
+            <a:r>
+              <a:rPr lang="en-US" dirty="0"/>
+              <a:t>Sean </a:t>
+            </a:r>
+            <a:r>
+              <a:rPr lang="en-US" dirty="0" err="1"/>
+              <a:t>Vovan</a:t>
+            </a:r>
+            <a:endParaRPr lang="en-US" dirty="0"/>
+          </a:p>
+        </p:txBody>
+      </p:sp>
     </p:spTree>
     <p:extLst>
       <p:ext uri="{BB962C8B-B14F-4D97-AF65-F5344CB8AC3E}">

</xml_diff>